<commit_message>
Version Final PPT CLEI
</commit_message>
<xml_diff>
--- a/Presentacion CLEI-JAIIO 2017.pptx
+++ b/Presentacion CLEI-JAIIO 2017.pptx
@@ -194,7 +194,7 @@
             </a:lvl1pPr>
           </a:lstStyle>
           <a:p>
-            <a:endParaRPr lang="en-US"/>
+            <a:endParaRPr lang="en-US" dirty="0"/>
           </a:p>
         </p:txBody>
       </p:sp>
@@ -227,9 +227,9 @@
           <a:p>
             <a:fld id="{48AEEB72-D29C-4654-B131-6A67889F7FFC}" type="datetimeFigureOut">
               <a:rPr lang="en-US" smtClean="0"/>
-              <a:t>02-Sep-17</a:t>
+              <a:t>9/6/2017</a:t>
             </a:fld>
-            <a:endParaRPr lang="en-US"/>
+            <a:endParaRPr lang="en-US" dirty="0"/>
           </a:p>
         </p:txBody>
       </p:sp>
@@ -262,7 +262,7 @@
           <a:bodyPr vert="horz" lIns="91440" tIns="45720" rIns="91440" bIns="45720" rtlCol="0" anchor="ctr"/>
           <a:lstStyle/>
           <a:p>
-            <a:endParaRPr lang="en-US"/>
+            <a:endParaRPr lang="en-US" dirty="0"/>
           </a:p>
         </p:txBody>
       </p:sp>
@@ -353,7 +353,7 @@
             </a:lvl1pPr>
           </a:lstStyle>
           <a:p>
-            <a:endParaRPr lang="en-US"/>
+            <a:endParaRPr lang="en-US" dirty="0"/>
           </a:p>
         </p:txBody>
       </p:sp>
@@ -388,7 +388,7 @@
               <a:rPr lang="en-US" smtClean="0"/>
               <a:t>‹Nº›</a:t>
             </a:fld>
-            <a:endParaRPr lang="en-US"/>
+            <a:endParaRPr lang="en-US" dirty="0"/>
           </a:p>
         </p:txBody>
       </p:sp>
@@ -539,7 +539,7 @@
           <a:bodyPr/>
           <a:lstStyle/>
           <a:p>
-            <a:endParaRPr lang="en-US"/>
+            <a:endParaRPr lang="en-US" dirty="0"/>
           </a:p>
         </p:txBody>
       </p:sp>
@@ -562,7 +562,7 @@
               <a:rPr lang="en-US" smtClean="0"/>
               <a:t>2</a:t>
             </a:fld>
-            <a:endParaRPr lang="en-US"/>
+            <a:endParaRPr lang="en-US" dirty="0"/>
           </a:p>
         </p:txBody>
       </p:sp>
@@ -1095,7 +1095,7 @@
           <a:p>
             <a:fld id="{6B44C3FB-0C1B-4587-AA30-CCEEC4CE2AF2}" type="datetime1">
               <a:rPr lang="en-US" smtClean="0"/>
-              <a:t>02-Sep-17</a:t>
+              <a:t>9/6/2017</a:t>
             </a:fld>
             <a:endParaRPr lang="en-US" dirty="0"/>
           </a:p>
@@ -1122,7 +1122,7 @@
           <a:lstStyle/>
           <a:p>
             <a:r>
-              <a:rPr lang="en-US" smtClean="0"/>
+              <a:rPr lang="en-US" dirty="0" smtClean="0"/>
               <a:t>Footer Text</a:t>
             </a:r>
             <a:endParaRPr lang="en-US" dirty="0"/>
@@ -1201,7 +1201,7 @@
           </a:ln>
           <a:extLst>
             <a:ext uri="{91240B29-F687-4f45-9708-019B960494DF}">
-              <a14:hiddenLine xmlns:a14="http://schemas.microsoft.com/office/drawing/2010/main" xmlns="" w="9525">
+              <a14:hiddenLine xmlns="" xmlns:a14="http://schemas.microsoft.com/office/drawing/2010/main" w="9525">
                 <a:solidFill>
                   <a:srgbClr val="000000"/>
                 </a:solidFill>
@@ -1256,7 +1256,7 @@
           </a:ln>
           <a:extLst>
             <a:ext uri="{91240B29-F687-4f45-9708-019B960494DF}">
-              <a14:hiddenLine xmlns:a14="http://schemas.microsoft.com/office/drawing/2010/main" xmlns="" w="9525">
+              <a14:hiddenLine xmlns="" xmlns:a14="http://schemas.microsoft.com/office/drawing/2010/main" w="9525">
                 <a:solidFill>
                   <a:srgbClr val="000000"/>
                 </a:solidFill>
@@ -1420,7 +1420,7 @@
           </a:lstStyle>
           <a:p>
             <a:r>
-              <a:rPr lang="es-ES" smtClean="0"/>
+              <a:rPr lang="es-ES" dirty="0" smtClean="0"/>
               <a:t>Haga clic en el icono para agregar una imagen</a:t>
             </a:r>
             <a:endParaRPr lang="en-US" dirty="0"/>
@@ -1511,7 +1511,7 @@
           <a:p>
             <a:fld id="{2DBCBCC0-40FC-491B-8D10-C384AE9F1066}" type="datetime1">
               <a:rPr lang="en-US" smtClean="0"/>
-              <a:t>02-Sep-17</a:t>
+              <a:t>9/6/2017</a:t>
             </a:fld>
             <a:endParaRPr lang="en-US" dirty="0"/>
           </a:p>
@@ -1533,7 +1533,7 @@
           <a:lstStyle/>
           <a:p>
             <a:r>
-              <a:rPr lang="en-US" smtClean="0"/>
+              <a:rPr lang="en-US" dirty="0" smtClean="0"/>
               <a:t>Footer Text</a:t>
             </a:r>
             <a:endParaRPr lang="en-US" dirty="0"/>
@@ -1764,7 +1764,7 @@
           <a:p>
             <a:fld id="{A427DC72-6895-476B-B521-5DD2E1CEADC2}" type="datetime1">
               <a:rPr lang="en-US" smtClean="0"/>
-              <a:t>02-Sep-17</a:t>
+              <a:t>9/6/2017</a:t>
             </a:fld>
             <a:endParaRPr lang="en-US" dirty="0"/>
           </a:p>
@@ -1786,7 +1786,7 @@
           <a:lstStyle/>
           <a:p>
             <a:r>
-              <a:rPr lang="en-US" smtClean="0"/>
+              <a:rPr lang="en-US" dirty="0" smtClean="0"/>
               <a:t>Footer Text</a:t>
             </a:r>
             <a:endParaRPr lang="en-US" dirty="0"/>
@@ -2309,7 +2309,7 @@
           <a:p>
             <a:fld id="{C26F630A-F03F-47CE-94AC-CE3D55FF32E3}" type="datetime1">
               <a:rPr lang="en-US" smtClean="0"/>
-              <a:t>02-Sep-17</a:t>
+              <a:t>9/6/2017</a:t>
             </a:fld>
             <a:endParaRPr lang="en-US" dirty="0"/>
           </a:p>
@@ -2331,7 +2331,7 @@
           <a:lstStyle/>
           <a:p>
             <a:r>
-              <a:rPr lang="en-US" smtClean="0"/>
+              <a:rPr lang="en-US" dirty="0" smtClean="0"/>
               <a:t>Footer Text</a:t>
             </a:r>
             <a:endParaRPr lang="en-US" dirty="0"/>
@@ -2562,7 +2562,7 @@
           <a:p>
             <a:fld id="{39BF7FC1-8C1C-4627-94FE-6C54B7745E0D}" type="datetime1">
               <a:rPr lang="en-US" smtClean="0"/>
-              <a:t>02-Sep-17</a:t>
+              <a:t>9/6/2017</a:t>
             </a:fld>
             <a:endParaRPr lang="en-US" dirty="0"/>
           </a:p>
@@ -2584,7 +2584,7 @@
           <a:lstStyle/>
           <a:p>
             <a:r>
-              <a:rPr lang="en-US" smtClean="0"/>
+              <a:rPr lang="en-US" dirty="0" smtClean="0"/>
               <a:t>Footer Text</a:t>
             </a:r>
             <a:endParaRPr lang="en-US" dirty="0"/>
@@ -3099,7 +3099,7 @@
           <a:p>
             <a:fld id="{ECF3D208-4F67-4D96-83A9-7C2FAC0713C8}" type="datetime1">
               <a:rPr lang="en-US" smtClean="0"/>
-              <a:t>02-Sep-17</a:t>
+              <a:t>9/6/2017</a:t>
             </a:fld>
             <a:endParaRPr lang="en-US" dirty="0"/>
           </a:p>
@@ -3121,7 +3121,7 @@
           <a:lstStyle/>
           <a:p>
             <a:r>
-              <a:rPr lang="en-US" smtClean="0"/>
+              <a:rPr lang="en-US" dirty="0" smtClean="0"/>
               <a:t>Footer Text</a:t>
             </a:r>
             <a:endParaRPr lang="en-US" dirty="0"/>
@@ -3401,7 +3401,7 @@
           <a:p>
             <a:fld id="{A602FC23-FDBB-4B95-8885-16FBB27F6D13}" type="datetime1">
               <a:rPr lang="en-US" smtClean="0"/>
-              <a:t>02-Sep-17</a:t>
+              <a:t>9/6/2017</a:t>
             </a:fld>
             <a:endParaRPr lang="en-US" dirty="0"/>
           </a:p>
@@ -3423,7 +3423,7 @@
           <a:lstStyle/>
           <a:p>
             <a:r>
-              <a:rPr lang="en-US" smtClean="0"/>
+              <a:rPr lang="en-US" dirty="0" smtClean="0"/>
               <a:t>Footer Text</a:t>
             </a:r>
             <a:endParaRPr lang="en-US" dirty="0"/>
@@ -3580,9 +3580,9 @@
           <a:p>
             <a:fld id="{CF9F94BE-B64F-42AF-8EBF-368519F43054}" type="datetime1">
               <a:rPr lang="en-US" smtClean="0"/>
-              <a:t>02-Sep-17</a:t>
+              <a:t>9/6/2017</a:t>
             </a:fld>
-            <a:endParaRPr lang="en-US"/>
+            <a:endParaRPr lang="en-US" dirty="0"/>
           </a:p>
         </p:txBody>
       </p:sp>
@@ -3602,10 +3602,10 @@
           <a:lstStyle/>
           <a:p>
             <a:r>
-              <a:rPr lang="en-US" smtClean="0"/>
+              <a:rPr lang="en-US" dirty="0" smtClean="0"/>
               <a:t>Footer Text</a:t>
             </a:r>
-            <a:endParaRPr lang="en-US"/>
+            <a:endParaRPr lang="en-US" dirty="0"/>
           </a:p>
         </p:txBody>
       </p:sp>
@@ -3629,7 +3629,7 @@
               <a:pPr/>
               <a:t>‹Nº›</a:t>
             </a:fld>
-            <a:endParaRPr lang="en-US"/>
+            <a:endParaRPr lang="en-US" dirty="0"/>
           </a:p>
         </p:txBody>
       </p:sp>
@@ -3765,9 +3765,9 @@
           <a:p>
             <a:fld id="{E321066C-EE91-4652-BF2E-C8A3185F8078}" type="datetime1">
               <a:rPr lang="en-US" smtClean="0"/>
-              <a:t>02-Sep-17</a:t>
+              <a:t>9/6/2017</a:t>
             </a:fld>
-            <a:endParaRPr lang="en-US"/>
+            <a:endParaRPr lang="en-US" dirty="0"/>
           </a:p>
         </p:txBody>
       </p:sp>
@@ -3787,10 +3787,10 @@
           <a:lstStyle/>
           <a:p>
             <a:r>
-              <a:rPr lang="en-US" smtClean="0"/>
+              <a:rPr lang="en-US" dirty="0" smtClean="0"/>
               <a:t>Footer Text</a:t>
             </a:r>
-            <a:endParaRPr lang="en-US"/>
+            <a:endParaRPr lang="en-US" dirty="0"/>
           </a:p>
         </p:txBody>
       </p:sp>
@@ -3814,7 +3814,7 @@
               <a:pPr/>
               <a:t>‹Nº›</a:t>
             </a:fld>
-            <a:endParaRPr lang="en-US"/>
+            <a:endParaRPr lang="en-US" dirty="0"/>
           </a:p>
         </p:txBody>
       </p:sp>
@@ -3955,9 +3955,9 @@
           <a:p>
             <a:fld id="{BDA91702-395E-4E81-BEED-6E52DCF43BC5}" type="datetime1">
               <a:rPr lang="en-US" smtClean="0"/>
-              <a:t>02-Sep-17</a:t>
+              <a:t>9/6/2017</a:t>
             </a:fld>
-            <a:endParaRPr lang="en-US"/>
+            <a:endParaRPr lang="en-US" dirty="0"/>
           </a:p>
         </p:txBody>
       </p:sp>
@@ -3982,10 +3982,10 @@
           <a:lstStyle/>
           <a:p>
             <a:r>
-              <a:rPr lang="en-US" smtClean="0"/>
+              <a:rPr lang="en-US" dirty="0" smtClean="0"/>
               <a:t>Footer Text</a:t>
             </a:r>
-            <a:endParaRPr lang="en-US"/>
+            <a:endParaRPr lang="en-US" dirty="0"/>
           </a:p>
         </p:txBody>
       </p:sp>
@@ -4014,7 +4014,7 @@
               <a:pPr/>
               <a:t>‹Nº›</a:t>
             </a:fld>
-            <a:endParaRPr lang="en-US"/>
+            <a:endParaRPr lang="en-US" dirty="0"/>
           </a:p>
         </p:txBody>
       </p:sp>
@@ -4216,9 +4216,9 @@
           <a:p>
             <a:fld id="{F25A2487-6AC6-46E3-B33D-5D05B123D4A7}" type="datetime1">
               <a:rPr lang="en-US" smtClean="0"/>
-              <a:t>02-Sep-17</a:t>
+              <a:t>9/6/2017</a:t>
             </a:fld>
-            <a:endParaRPr lang="en-US"/>
+            <a:endParaRPr lang="en-US" dirty="0"/>
           </a:p>
         </p:txBody>
       </p:sp>
@@ -4238,10 +4238,10 @@
           <a:lstStyle/>
           <a:p>
             <a:r>
-              <a:rPr lang="en-US" smtClean="0"/>
+              <a:rPr lang="en-US" dirty="0" smtClean="0"/>
               <a:t>Footer Text</a:t>
             </a:r>
-            <a:endParaRPr lang="en-US"/>
+            <a:endParaRPr lang="en-US" dirty="0"/>
           </a:p>
         </p:txBody>
       </p:sp>
@@ -4270,7 +4270,7 @@
               <a:pPr/>
               <a:t>‹Nº›</a:t>
             </a:fld>
-            <a:endParaRPr lang="en-US"/>
+            <a:endParaRPr lang="en-US" dirty="0"/>
           </a:p>
         </p:txBody>
       </p:sp>
@@ -4523,9 +4523,9 @@
           <a:p>
             <a:fld id="{F4C275C9-F92A-47FB-9FCC-3D0924A5F798}" type="datetime1">
               <a:rPr lang="en-US" smtClean="0"/>
-              <a:t>02-Sep-17</a:t>
+              <a:t>9/6/2017</a:t>
             </a:fld>
-            <a:endParaRPr lang="en-US"/>
+            <a:endParaRPr lang="en-US" dirty="0"/>
           </a:p>
         </p:txBody>
       </p:sp>
@@ -4545,10 +4545,10 @@
           <a:lstStyle/>
           <a:p>
             <a:r>
-              <a:rPr lang="en-US" smtClean="0"/>
+              <a:rPr lang="en-US" dirty="0" smtClean="0"/>
               <a:t>Footer Text</a:t>
             </a:r>
-            <a:endParaRPr lang="en-US"/>
+            <a:endParaRPr lang="en-US" dirty="0"/>
           </a:p>
         </p:txBody>
       </p:sp>
@@ -4572,7 +4572,7 @@
               <a:pPr/>
               <a:t>‹Nº›</a:t>
             </a:fld>
-            <a:endParaRPr lang="en-US"/>
+            <a:endParaRPr lang="en-US" dirty="0"/>
           </a:p>
         </p:txBody>
       </p:sp>
@@ -4970,9 +4970,9 @@
           <a:p>
             <a:fld id="{EE401011-EE6D-47E3-A183-A83860EF6B77}" type="datetime1">
               <a:rPr lang="en-US" smtClean="0"/>
-              <a:t>02-Sep-17</a:t>
+              <a:t>9/6/2017</a:t>
             </a:fld>
-            <a:endParaRPr lang="en-US"/>
+            <a:endParaRPr lang="en-US" dirty="0"/>
           </a:p>
         </p:txBody>
       </p:sp>
@@ -4992,10 +4992,10 @@
           <a:lstStyle/>
           <a:p>
             <a:r>
-              <a:rPr lang="en-US" smtClean="0"/>
+              <a:rPr lang="en-US" dirty="0" smtClean="0"/>
               <a:t>Footer Text</a:t>
             </a:r>
-            <a:endParaRPr lang="en-US"/>
+            <a:endParaRPr lang="en-US" dirty="0"/>
           </a:p>
         </p:txBody>
       </p:sp>
@@ -5019,7 +5019,7 @@
               <a:pPr/>
               <a:t>‹Nº›</a:t>
             </a:fld>
-            <a:endParaRPr lang="en-US"/>
+            <a:endParaRPr lang="en-US" dirty="0"/>
           </a:p>
         </p:txBody>
       </p:sp>
@@ -5093,7 +5093,7 @@
           <a:p>
             <a:fld id="{63A2ADCF-5041-4F5A-9331-2A3E5401F304}" type="datetime1">
               <a:rPr lang="en-US" smtClean="0"/>
-              <a:t>02-Sep-17</a:t>
+              <a:t>9/6/2017</a:t>
             </a:fld>
             <a:endParaRPr lang="en-US" dirty="0"/>
           </a:p>
@@ -5115,7 +5115,7 @@
           <a:lstStyle/>
           <a:p>
             <a:r>
-              <a:rPr lang="en-US" smtClean="0"/>
+              <a:rPr lang="en-US" dirty="0" smtClean="0"/>
               <a:t>Footer Text</a:t>
             </a:r>
             <a:endParaRPr lang="en-US" dirty="0"/>
@@ -5193,9 +5193,9 @@
           <a:p>
             <a:fld id="{E9BCB32F-AA65-4962-8231-1A87B5955612}" type="datetime1">
               <a:rPr lang="en-US" smtClean="0"/>
-              <a:t>02-Sep-17</a:t>
+              <a:t>9/6/2017</a:t>
             </a:fld>
-            <a:endParaRPr lang="en-US"/>
+            <a:endParaRPr lang="en-US" dirty="0"/>
           </a:p>
         </p:txBody>
       </p:sp>
@@ -5215,10 +5215,10 @@
           <a:lstStyle/>
           <a:p>
             <a:r>
-              <a:rPr lang="en-US" smtClean="0"/>
+              <a:rPr lang="en-US" dirty="0" smtClean="0"/>
               <a:t>Footer Text</a:t>
             </a:r>
-            <a:endParaRPr lang="en-US"/>
+            <a:endParaRPr lang="en-US" dirty="0"/>
           </a:p>
         </p:txBody>
       </p:sp>
@@ -5242,7 +5242,7 @@
               <a:pPr/>
               <a:t>‹Nº›</a:t>
             </a:fld>
-            <a:endParaRPr lang="en-US"/>
+            <a:endParaRPr lang="en-US" dirty="0"/>
           </a:p>
         </p:txBody>
       </p:sp>
@@ -5481,9 +5481,9 @@
           <a:p>
             <a:fld id="{B0ED3D63-26E0-49D8-BAA7-43843CC8105C}" type="datetime1">
               <a:rPr lang="en-US" smtClean="0"/>
-              <a:t>02-Sep-17</a:t>
+              <a:t>9/6/2017</a:t>
             </a:fld>
-            <a:endParaRPr lang="en-US"/>
+            <a:endParaRPr lang="en-US" dirty="0"/>
           </a:p>
         </p:txBody>
       </p:sp>
@@ -5503,10 +5503,10 @@
           <a:lstStyle/>
           <a:p>
             <a:r>
-              <a:rPr lang="en-US" smtClean="0"/>
+              <a:rPr lang="en-US" dirty="0" smtClean="0"/>
               <a:t>Footer Text</a:t>
             </a:r>
-            <a:endParaRPr lang="en-US"/>
+            <a:endParaRPr lang="en-US" dirty="0"/>
           </a:p>
         </p:txBody>
       </p:sp>
@@ -5530,7 +5530,7 @@
               <a:pPr/>
               <a:t>‹Nº›</a:t>
             </a:fld>
-            <a:endParaRPr lang="en-US"/>
+            <a:endParaRPr lang="en-US" dirty="0"/>
           </a:p>
         </p:txBody>
       </p:sp>
@@ -5686,7 +5686,7 @@
           </a:lstStyle>
           <a:p>
             <a:r>
-              <a:rPr lang="es-ES" smtClean="0"/>
+              <a:rPr lang="es-ES" dirty="0" smtClean="0"/>
               <a:t>Haga clic en el icono para agregar una imagen</a:t>
             </a:r>
             <a:endParaRPr lang="en-US" dirty="0"/>
@@ -5777,9 +5777,9 @@
           <a:p>
             <a:fld id="{AA6280C2-7C8C-45EA-8ECA-EDC8E027C302}" type="datetime1">
               <a:rPr lang="en-US" smtClean="0"/>
-              <a:t>02-Sep-17</a:t>
+              <a:t>9/6/2017</a:t>
             </a:fld>
-            <a:endParaRPr lang="en-US"/>
+            <a:endParaRPr lang="en-US" dirty="0"/>
           </a:p>
         </p:txBody>
       </p:sp>
@@ -5799,10 +5799,10 @@
           <a:lstStyle/>
           <a:p>
             <a:r>
-              <a:rPr lang="en-US" smtClean="0"/>
+              <a:rPr lang="en-US" dirty="0" smtClean="0"/>
               <a:t>Footer Text</a:t>
             </a:r>
-            <a:endParaRPr lang="en-US"/>
+            <a:endParaRPr lang="en-US" dirty="0"/>
           </a:p>
         </p:txBody>
       </p:sp>
@@ -5826,7 +5826,7 @@
               <a:pPr/>
               <a:t>‹Nº›</a:t>
             </a:fld>
-            <a:endParaRPr lang="en-US"/>
+            <a:endParaRPr lang="en-US" dirty="0"/>
           </a:p>
         </p:txBody>
       </p:sp>
@@ -6306,7 +6306,7 @@
           <a:p>
             <a:fld id="{86270A0B-8AA3-43C5-9EE0-1493BF60B2CA}" type="datetime1">
               <a:rPr lang="en-US" smtClean="0"/>
-              <a:t>02-Sep-17</a:t>
+              <a:t>9/6/2017</a:t>
             </a:fld>
             <a:endParaRPr lang="en-US" dirty="0"/>
           </a:p>
@@ -6346,7 +6346,7 @@
           </a:lstStyle>
           <a:p>
             <a:r>
-              <a:rPr lang="en-US" smtClean="0"/>
+              <a:rPr lang="en-US" dirty="0" smtClean="0"/>
               <a:t>Footer Text</a:t>
             </a:r>
             <a:endParaRPr lang="en-US" dirty="0"/>
@@ -6930,18 +6930,10 @@
             </a:pPr>
             <a:r>
               <a:rPr lang="es-ES" sz="3200" b="1" dirty="0"/>
-              <a:t>Técnica de pronóstico de la demanda basada en Business </a:t>
-            </a:r>
-            <a:r>
-              <a:rPr lang="es-ES" sz="3200" b="1" dirty="0" err="1"/>
-              <a:t>Intelligence</a:t>
+              <a:t>Técnica de pronóstico de la demanda basada en Business Intelligence y Machine </a:t>
             </a:r>
             <a:r>
               <a:rPr lang="es-ES" sz="3200" b="1" dirty="0"/>
-              <a:t> y Machine </a:t>
-            </a:r>
-            <a:r>
-              <a:rPr lang="es-ES" sz="3200" b="1" dirty="0" err="1"/>
               <a:t>Learning</a:t>
             </a:r>
             <a:r>
@@ -7162,7 +7154,7 @@
               <a:t>Alberto </a:t>
             </a:r>
             <a:r>
-              <a:rPr lang="es-ES" sz="2400" dirty="0" err="1" smtClean="0">
+              <a:rPr lang="es-ES" sz="2400" dirty="0" smtClean="0">
                 <a:latin typeface="Times New Roman" pitchFamily="18" charset="0"/>
                 <a:cs typeface="Times New Roman" pitchFamily="18" charset="0"/>
               </a:rPr>
@@ -7256,7 +7248,7 @@
           <a:p>
             <a:pPr algn="ctr"/>
             <a:r>
-              <a:rPr lang="es-ES" sz="2400" dirty="0" err="1" smtClean="0">
+              <a:rPr lang="es-ES" sz="2400" dirty="0" smtClean="0">
                 <a:latin typeface="Times New Roman" pitchFamily="18" charset="0"/>
                 <a:cs typeface="Times New Roman" pitchFamily="18" charset="0"/>
               </a:rPr>
@@ -7287,7 +7279,7 @@
               <a:t>Ing. </a:t>
             </a:r>
             <a:r>
-              <a:rPr lang="es-ES" sz="2400" dirty="0" err="1" smtClean="0">
+              <a:rPr lang="es-ES" sz="2400" dirty="0" smtClean="0">
                 <a:latin typeface="Times New Roman" pitchFamily="18" charset="0"/>
                 <a:cs typeface="Times New Roman" pitchFamily="18" charset="0"/>
               </a:rPr>
@@ -7317,11 +7309,7 @@
             <a:pPr algn="ctr"/>
             <a:r>
               <a:rPr lang="es-ES" b="1" dirty="0" smtClean="0"/>
-              <a:t>CLEI/JAIIO 2017</a:t>
-            </a:r>
-            <a:r>
-              <a:rPr lang="es-ES" b="1" dirty="0" smtClean="0"/>
-              <a:t> </a:t>
+              <a:t>CLEI/JAIIO 2017 </a:t>
             </a:r>
             <a:r>
               <a:rPr lang="es-ES" b="1" dirty="0"/>
@@ -7329,11 +7317,7 @@
             </a:r>
             <a:r>
               <a:rPr lang="es-ES" b="1" dirty="0" smtClean="0"/>
-              <a:t>Córdoba – </a:t>
-            </a:r>
-            <a:r>
-              <a:rPr lang="es-ES" b="1" dirty="0" smtClean="0"/>
-              <a:t>Argentina</a:t>
+              <a:t>Córdoba – Argentina</a:t>
             </a:r>
             <a:endParaRPr lang="es-PY" b="1" dirty="0"/>
           </a:p>
@@ -7510,7 +7494,7 @@
               <a:t>Machine </a:t>
             </a:r>
             <a:r>
-              <a:rPr lang="es-ES" b="1" dirty="0" err="1" smtClean="0"/>
+              <a:rPr lang="es-ES" b="1" dirty="0" smtClean="0"/>
               <a:t>Learning</a:t>
             </a:r>
             <a:r>
@@ -7824,7 +7808,7 @@
               <a:t>(</a:t>
             </a:r>
             <a:r>
-              <a:rPr lang="es-ES" sz="1900" b="1" dirty="0" err="1"/>
+              <a:rPr lang="es-ES" sz="1900" b="1" dirty="0"/>
               <a:t>examples</a:t>
             </a:r>
             <a:r>
@@ -7840,7 +7824,7 @@
               <a:t>(</a:t>
             </a:r>
             <a:r>
-              <a:rPr lang="es-ES" sz="1900" b="1" dirty="0" err="1"/>
+              <a:rPr lang="es-ES" sz="1900" b="1" dirty="0"/>
               <a:t>features</a:t>
             </a:r>
             <a:r>
@@ -7849,15 +7833,7 @@
             </a:r>
             <a:r>
               <a:rPr lang="es-ES" sz="1900" dirty="0"/>
-              <a:t>. Para el problema de estudio el proceso de Business </a:t>
-            </a:r>
-            <a:r>
-              <a:rPr lang="es-ES" sz="1900" dirty="0" err="1"/>
-              <a:t>Intelligence</a:t>
-            </a:r>
-            <a:r>
-              <a:rPr lang="es-ES" sz="1900" dirty="0"/>
-              <a:t> es quien provee las instancias. El grupo de ejemplos o instancias utilizados en el proceso de entrenamiento de los algoritmos de aprendizaje automático constituyen el conjunto de entrenamiento </a:t>
+              <a:t>. Para el problema de estudio el proceso de Business Intelligence es quien provee las instancias. El grupo de ejemplos o instancias utilizados en el proceso de entrenamiento de los algoritmos de aprendizaje automático constituyen el conjunto de entrenamiento </a:t>
             </a:r>
             <a:r>
               <a:rPr lang="es-ES" sz="1900" b="1" dirty="0"/>
@@ -8028,7 +8004,7 @@
               <a:t>Machine </a:t>
             </a:r>
             <a:r>
-              <a:rPr lang="es-ES" b="1" dirty="0" err="1" smtClean="0"/>
+              <a:rPr lang="es-ES" b="1" dirty="0" smtClean="0"/>
               <a:t>Learning</a:t>
             </a:r>
             <a:r>
@@ -8377,7 +8353,7 @@
               <a:buChar char="ü"/>
             </a:pPr>
             <a:r>
-              <a:rPr lang="en-US" sz="2000" dirty="0" err="1"/>
+              <a:rPr lang="en-US" sz="2000" dirty="0"/>
               <a:t>Porcentaje</a:t>
             </a:r>
             <a:r>
@@ -8385,7 +8361,7 @@
               <a:t> de </a:t>
             </a:r>
             <a:r>
-              <a:rPr lang="en-US" sz="2000" dirty="0" err="1" smtClean="0"/>
+              <a:rPr lang="en-US" sz="2000" dirty="0" smtClean="0"/>
               <a:t>Aciertos</a:t>
             </a:r>
             <a:endParaRPr lang="en-US" sz="2000" dirty="0" smtClean="0"/>
@@ -8396,7 +8372,7 @@
               <a:buChar char="ü"/>
             </a:pPr>
             <a:r>
-              <a:rPr lang="en-US" sz="2000" dirty="0" err="1"/>
+              <a:rPr lang="en-US" sz="2000" dirty="0"/>
               <a:t>Estadística</a:t>
             </a:r>
             <a:r>
@@ -9073,10 +9049,9 @@
               <a:t>Datos proveídos por Business </a:t>
             </a:r>
             <a:r>
-              <a:rPr lang="es-ES" sz="2400" b="1" u="sng" dirty="0" err="1" smtClean="0"/>
+              <a:rPr lang="es-ES" sz="2400" b="1" u="sng" dirty="0" smtClean="0"/>
               <a:t>Intelligence</a:t>
             </a:r>
-            <a:endParaRPr lang="es-ES" sz="2400" b="1" u="sng" dirty="0" smtClean="0"/>
           </a:p>
           <a:p>
             <a:pPr algn="just"/>
@@ -12249,23 +12224,7 @@
             </a:r>
             <a:r>
               <a:rPr lang="es-ES" sz="2400" dirty="0"/>
-              <a:t> de estimación de la demanda de productos, para reposición de stock en empresas </a:t>
-            </a:r>
-            <a:r>
-              <a:rPr lang="es-ES" sz="2400" dirty="0" err="1"/>
-              <a:t>retail</a:t>
-            </a:r>
-            <a:r>
-              <a:rPr lang="es-ES" sz="2400" dirty="0"/>
-              <a:t>. Como se mencionó en la Sección 2, la gestión de compras es uno los ejes centrales en la actividad empresarial y la decisión del volumen de compras para cada producto es un desafío que enfrentan las empresas al momento de reponer el stock. Partiendo de esta premisa y analizando las técnicas de pronóstico de la demanda empleadas en la actualidad, y el creciente incremento del uso de tecnologías de Business </a:t>
-            </a:r>
-            <a:r>
-              <a:rPr lang="es-ES" sz="2400" dirty="0" err="1"/>
-              <a:t>Intelligence</a:t>
-            </a:r>
-            <a:r>
-              <a:rPr lang="es-ES" sz="2400" dirty="0"/>
-              <a:t> en las organizaciones, se encontró la oportunidad de desarrollar una nueva técnica de pronóstico. En esta nueva técnica se utilizan los </a:t>
+              <a:t> de estimación de la demanda de productos, para reposición de stock en empresas retail. Como se mencionó en la Sección 2, la gestión de compras es uno los ejes centrales en la actividad empresarial y la decisión del volumen de compras para cada producto es un desafío que enfrentan las empresas al momento de reponer el stock. Partiendo de esta premisa y analizando las técnicas de pronóstico de la demanda empleadas en la actualidad, y el creciente incremento del uso de tecnologías de Business Intelligence en las organizaciones, se encontró la oportunidad de desarrollar una nueva técnica de pronóstico. En esta nueva técnica se utilizan los </a:t>
             </a:r>
             <a:r>
               <a:rPr lang="es-ES" sz="2400" b="1" dirty="0"/>
@@ -12292,7 +12251,7 @@
               <a:t>algoritmos de clasificación de Machine </a:t>
             </a:r>
             <a:r>
-              <a:rPr lang="es-ES" sz="2400" b="1" dirty="0" err="1"/>
+              <a:rPr lang="es-ES" sz="2400" b="1" dirty="0"/>
               <a:t>Learning</a:t>
             </a:r>
             <a:r>
@@ -12774,18 +12733,10 @@
             </a:r>
             <a:r>
               <a:rPr lang="es-PY" dirty="0"/>
-              <a:t>Business </a:t>
-            </a:r>
-            <a:r>
-              <a:rPr lang="es-PY" dirty="0" err="1"/>
-              <a:t>Intelligence</a:t>
-            </a:r>
-            <a:r>
-              <a:rPr lang="es-PY" dirty="0"/>
-              <a:t> y Machine </a:t>
-            </a:r>
-            <a:r>
-              <a:rPr lang="es-PY" dirty="0" err="1" smtClean="0"/>
+              <a:t>Business Intelligence y Machine </a:t>
+            </a:r>
+            <a:r>
+              <a:rPr lang="es-PY" dirty="0" smtClean="0"/>
               <a:t>Learning</a:t>
             </a:r>
             <a:r>
@@ -13809,7 +13760,7 @@
               <a:buAutoNum type="arabicPeriod"/>
             </a:pPr>
             <a:r>
-              <a:rPr lang="en-US" sz="2100" b="1" dirty="0" err="1" smtClean="0"/>
+              <a:rPr lang="en-US" sz="2100" b="1" dirty="0" smtClean="0"/>
               <a:t>Métodos</a:t>
             </a:r>
             <a:r>
@@ -13821,7 +13772,7 @@
               <a:t>de </a:t>
             </a:r>
             <a:r>
-              <a:rPr lang="en-US" sz="2100" b="1" dirty="0" err="1"/>
+              <a:rPr lang="en-US" sz="2100" b="1" dirty="0"/>
               <a:t>pronósticos</a:t>
             </a:r>
             <a:r>
@@ -13829,7 +13780,7 @@
               <a:t> </a:t>
             </a:r>
             <a:r>
-              <a:rPr lang="en-US" sz="2100" b="1" dirty="0" err="1" smtClean="0"/>
+              <a:rPr lang="en-US" sz="2100" b="1" dirty="0" smtClean="0"/>
               <a:t>cualitativos</a:t>
             </a:r>
             <a:endParaRPr lang="en-US" sz="2100" b="1" dirty="0" smtClean="0"/>
@@ -13939,7 +13890,7 @@
               <a:buAutoNum type="arabicPeriod"/>
             </a:pPr>
             <a:r>
-              <a:rPr lang="en-US" sz="2100" b="1" dirty="0" err="1" smtClean="0"/>
+              <a:rPr lang="en-US" sz="2100" b="1" dirty="0" smtClean="0"/>
               <a:t>Métodos</a:t>
             </a:r>
             <a:r>
@@ -13951,7 +13902,7 @@
               <a:t>de </a:t>
             </a:r>
             <a:r>
-              <a:rPr lang="en-US" sz="2100" b="1" dirty="0" err="1"/>
+              <a:rPr lang="en-US" sz="2100" b="1" dirty="0"/>
               <a:t>pronósticos</a:t>
             </a:r>
             <a:r>
@@ -13959,7 +13910,7 @@
               <a:t> </a:t>
             </a:r>
             <a:r>
-              <a:rPr lang="en-US" sz="2100" b="1" dirty="0" err="1" smtClean="0"/>
+              <a:rPr lang="en-US" sz="2100" b="1" dirty="0" smtClean="0"/>
               <a:t>cuantitativos</a:t>
             </a:r>
             <a:endParaRPr lang="en-US" sz="2100" b="1" dirty="0"/>
@@ -14067,7 +14018,7 @@
               <a:t>	2.1.4 El método de pronóstico por </a:t>
             </a:r>
             <a:r>
-              <a:rPr lang="es-ES" sz="2100" dirty="0" err="1">
+              <a:rPr lang="es-ES" sz="2100" dirty="0">
                 <a:solidFill>
                   <a:schemeClr val="tx1"/>
                 </a:solidFill>
@@ -14113,7 +14064,7 @@
               <a:t>	2.1.5 El método de </a:t>
             </a:r>
             <a:r>
-              <a:rPr lang="es-ES" sz="2100" dirty="0" err="1">
+              <a:rPr lang="es-ES" sz="2100" dirty="0">
                 <a:solidFill>
                   <a:schemeClr val="tx1"/>
                 </a:solidFill>
@@ -14164,7 +14115,7 @@
               <a:t>2.2 </a:t>
             </a:r>
             <a:r>
-              <a:rPr lang="en-US" sz="2100" b="1" dirty="0" err="1" smtClean="0">
+              <a:rPr lang="en-US" sz="2100" b="1" dirty="0" smtClean="0">
                 <a:solidFill>
                   <a:schemeClr val="tx1"/>
                 </a:solidFill>
@@ -14180,7 +14131,7 @@
               <a:t> </a:t>
             </a:r>
             <a:r>
-              <a:rPr lang="en-US" sz="2100" b="1" dirty="0" err="1" smtClean="0">
+              <a:rPr lang="en-US" sz="2100" b="1" dirty="0" smtClean="0">
                 <a:solidFill>
                   <a:schemeClr val="tx1"/>
                 </a:solidFill>
@@ -14369,7 +14320,7 @@
         </p:blipFill>
         <p:spPr>
           <a:xfrm>
-            <a:off x="3410498" y="5335474"/>
+            <a:off x="3410498" y="5301208"/>
             <a:ext cx="4848902" cy="257211"/>
           </a:xfrm>
           <a:prstGeom prst="rect">
@@ -14399,7 +14350,7 @@
         </p:blipFill>
         <p:spPr>
           <a:xfrm>
-            <a:off x="3410498" y="5605187"/>
+            <a:off x="3410498" y="5548053"/>
             <a:ext cx="4248743" cy="257211"/>
           </a:xfrm>
           <a:prstGeom prst="rect">
@@ -14429,7 +14380,7 @@
         </p:blipFill>
         <p:spPr>
           <a:xfrm>
-            <a:off x="2704202" y="5846808"/>
+            <a:off x="2704202" y="5805264"/>
             <a:ext cx="6258798" cy="247685"/>
           </a:xfrm>
           <a:prstGeom prst="rect">
@@ -14635,15 +14586,7 @@
           <a:p>
             <a:r>
               <a:rPr lang="es-ES" sz="5200" b="1" dirty="0"/>
-              <a:t>Business </a:t>
-            </a:r>
-            <a:r>
-              <a:rPr lang="es-ES" sz="5200" b="1" dirty="0" err="1"/>
-              <a:t>Intelligence</a:t>
-            </a:r>
-            <a:r>
-              <a:rPr lang="es-ES" sz="5200" b="1" dirty="0"/>
-              <a:t> </a:t>
+              <a:t>Business Intelligence </a:t>
             </a:r>
             <a:r>
               <a:rPr lang="es-PY" sz="5200" dirty="0" smtClean="0"/>
@@ -14925,42 +14868,10 @@
                   <a:schemeClr val="tx1"/>
                 </a:solidFill>
               </a:rPr>
-              <a:t>“Business </a:t>
-            </a:r>
-            <a:r>
-              <a:rPr lang="es-ES" sz="1800" i="1" dirty="0" err="1">
-                <a:solidFill>
-                  <a:schemeClr val="tx1"/>
-                </a:solidFill>
-              </a:rPr>
-              <a:t>Intelligence</a:t>
+              <a:t>“Business Intelligence es un término paraguas que abarca los procesos, las herramientas y las tecnologías para convertir datos en información, información en conocimiento y planes para conducir de forma eficaz las actividades de los negocios. Business Intelligence abarca las tecnologías de </a:t>
             </a:r>
             <a:r>
               <a:rPr lang="es-ES" sz="1800" i="1" dirty="0">
-                <a:solidFill>
-                  <a:schemeClr val="tx1"/>
-                </a:solidFill>
-              </a:rPr>
-              <a:t> es un término paraguas que abarca los procesos, las herramientas y las tecnologías para convertir datos en información, información en conocimiento y planes para conducir de forma eficaz las actividades de los negocios. Business </a:t>
-            </a:r>
-            <a:r>
-              <a:rPr lang="es-ES" sz="1800" i="1" dirty="0" err="1">
-                <a:solidFill>
-                  <a:schemeClr val="tx1"/>
-                </a:solidFill>
-              </a:rPr>
-              <a:t>Intelligence</a:t>
-            </a:r>
-            <a:r>
-              <a:rPr lang="es-ES" sz="1800" i="1" dirty="0">
-                <a:solidFill>
-                  <a:schemeClr val="tx1"/>
-                </a:solidFill>
-              </a:rPr>
-              <a:t> abarca las tecnologías de </a:t>
-            </a:r>
-            <a:r>
-              <a:rPr lang="es-ES" sz="1800" i="1" dirty="0" err="1">
                 <a:solidFill>
                   <a:schemeClr val="tx1"/>
                 </a:solidFill>
@@ -14976,7 +14887,7 @@
               <a:t>, los procesos en el 'back </a:t>
             </a:r>
             <a:r>
-              <a:rPr lang="es-ES" sz="1800" i="1" dirty="0" err="1">
+              <a:rPr lang="es-ES" sz="1800" i="1" dirty="0">
                 <a:solidFill>
                   <a:schemeClr val="tx1"/>
                 </a:solidFill>
@@ -14989,26 +14900,10 @@
                   <a:schemeClr val="tx1"/>
                 </a:solidFill>
               </a:rPr>
-              <a:t>', consultas, informes, análisis y las herramientas para mostrar información (herramientas de Business </a:t>
-            </a:r>
-            <a:r>
-              <a:rPr lang="es-ES" sz="1800" i="1" dirty="0" err="1">
-                <a:solidFill>
-                  <a:schemeClr val="tx1"/>
-                </a:solidFill>
-              </a:rPr>
-              <a:t>Intelligence</a:t>
+              <a:t>', consultas, informes, análisis y las herramientas para mostrar información (herramientas de Business Intelligence) y los procesos en el '</a:t>
             </a:r>
             <a:r>
               <a:rPr lang="es-ES" sz="1800" i="1" dirty="0">
-                <a:solidFill>
-                  <a:schemeClr val="tx1"/>
-                </a:solidFill>
-              </a:rPr>
-              <a:t>) y los procesos en el '</a:t>
-            </a:r>
-            <a:r>
-              <a:rPr lang="es-ES" sz="1800" i="1" dirty="0" err="1">
                 <a:solidFill>
                   <a:schemeClr val="tx1"/>
                 </a:solidFill>
@@ -15024,7 +14919,7 @@
               <a:t> </a:t>
             </a:r>
             <a:r>
-              <a:rPr lang="es-ES" sz="1800" i="1" dirty="0" err="1">
+              <a:rPr lang="es-ES" sz="1800" i="1" dirty="0">
                 <a:solidFill>
                   <a:schemeClr val="tx1"/>
                 </a:solidFill>
@@ -15125,7 +15020,7 @@
               <a:t>El </a:t>
             </a:r>
             <a:r>
-              <a:rPr lang="es-PY" sz="1600" dirty="0" err="1" smtClean="0">
+              <a:rPr lang="es-PY" sz="1600" dirty="0" smtClean="0">
                 <a:solidFill>
                   <a:schemeClr val="tx1"/>
                 </a:solidFill>
@@ -15244,7 +15139,7 @@
         </p:nvSpPr>
         <p:spPr>
           <a:xfrm>
-            <a:off x="755576" y="1124744"/>
+            <a:off x="792089" y="980728"/>
             <a:ext cx="8388423" cy="5472607"/>
           </a:xfrm>
           <a:prstGeom prst="rect">
@@ -15253,7 +15148,7 @@
         </p:spPr>
         <p:txBody>
           <a:bodyPr vert="horz" lIns="91440" tIns="45720" rIns="91440" bIns="45720" rtlCol="0" anchor="t">
-            <a:normAutofit/>
+            <a:normAutofit lnSpcReduction="10000"/>
           </a:bodyPr>
           <a:lstStyle>
             <a:lvl1pPr marL="0" indent="0" algn="r" defTabSz="457200" rtl="0" eaLnBrk="1" latinLnBrk="0" hangingPunct="1">
@@ -15501,7 +15396,7 @@
           <a:p>
             <a:pPr algn="just"/>
             <a:r>
-              <a:rPr lang="en-US" sz="2400" b="1" dirty="0" err="1" smtClean="0"/>
+              <a:rPr lang="en-US" sz="2400" b="1" dirty="0" smtClean="0"/>
               <a:t>Modelado</a:t>
             </a:r>
             <a:r>
@@ -15509,7 +15404,7 @@
               <a:t> del </a:t>
             </a:r>
             <a:r>
-              <a:rPr lang="en-US" sz="2400" b="1" dirty="0" err="1" smtClean="0"/>
+              <a:rPr lang="en-US" sz="2400" b="1" dirty="0" smtClean="0"/>
               <a:t>problema</a:t>
             </a:r>
             <a:endParaRPr lang="es-ES" sz="2400" b="1" dirty="0" smtClean="0">
@@ -15759,12 +15654,52 @@
               <a:t>Proceso ETL: </a:t>
             </a:r>
             <a:r>
+              <a:rPr lang="es-PY" sz="1400" b="1" dirty="0">
+                <a:solidFill>
+                  <a:schemeClr val="tx1"/>
+                </a:solidFill>
+              </a:rPr>
+              <a:t>Productos</a:t>
+            </a:r>
+            <a:r>
+              <a:rPr lang="es-PY" sz="1400" dirty="0">
+                <a:solidFill>
+                  <a:schemeClr val="tx1"/>
+                </a:solidFill>
+              </a:rPr>
+              <a:t> </a:t>
+            </a:r>
+            <a:r>
+              <a:rPr lang="es-PY" sz="1400" b="1" dirty="0" smtClean="0">
+                <a:solidFill>
+                  <a:schemeClr val="tx1"/>
+                </a:solidFill>
+              </a:rPr>
+              <a:t>con proveedor </a:t>
+            </a:r>
+            <a:r>
+              <a:rPr lang="es-PY" sz="1400" b="1" dirty="0">
+                <a:solidFill>
+                  <a:schemeClr val="tx1"/>
+                </a:solidFill>
+              </a:rPr>
+              <a:t>nulo</a:t>
+            </a:r>
+            <a:r>
+              <a:rPr lang="es-PY" sz="1400" dirty="0">
+                <a:solidFill>
+                  <a:schemeClr val="tx1"/>
+                </a:solidFill>
+              </a:rPr>
+              <a:t> al cual se asignó un proveedor por defecto de la tabla </a:t>
+            </a:r>
+            <a:r>
               <a:rPr lang="es-PY" sz="1400" dirty="0" smtClean="0">
                 <a:solidFill>
                   <a:schemeClr val="tx1"/>
                 </a:solidFill>
               </a:rPr>
-              <a:t>Durante </a:t>
+              <a:t>proveedores</a:t>
             </a:r>
             <a:r>
               <a:rPr lang="es-PY" sz="1400" dirty="0">
@@ -15772,7 +15707,31 @@
                   <a:schemeClr val="tx1"/>
                 </a:solidFill>
               </a:rPr>
-              <a:t>el proceso ETL se realizó </a:t>
+              <a:t>, </a:t>
+            </a:r>
+            <a:r>
+              <a:rPr lang="es-PY" sz="1400" b="1" dirty="0" smtClean="0">
+                <a:solidFill>
+                  <a:schemeClr val="tx1"/>
+                </a:solidFill>
+              </a:rPr>
+              <a:t>productos con </a:t>
+            </a:r>
+            <a:r>
+              <a:rPr lang="es-PY" sz="1400" b="1" dirty="0">
+                <a:solidFill>
+                  <a:schemeClr val="tx1"/>
+                </a:solidFill>
+              </a:rPr>
+              <a:t>costo cero</a:t>
+            </a:r>
+            <a:r>
+              <a:rPr lang="es-PY" sz="1400" dirty="0">
+                <a:solidFill>
+                  <a:schemeClr val="tx1"/>
+                </a:solidFill>
+              </a:rPr>
+              <a:t>, en tal caso dichos valores eran asignados con un costo promedio </a:t>
             </a:r>
             <a:r>
               <a:rPr lang="es-PY" sz="1400" dirty="0" smtClean="0">
@@ -15780,7 +15739,7 @@
                   <a:schemeClr val="tx1"/>
                 </a:solidFill>
               </a:rPr>
-              <a:t>la extracción de los datos de la fuentes de origen, </a:t>
+              <a:t>de </a:t>
             </a:r>
             <a:r>
               <a:rPr lang="es-PY" sz="1400" dirty="0">
@@ -15788,7 +15747,7 @@
                   <a:schemeClr val="tx1"/>
                 </a:solidFill>
               </a:rPr>
-              <a:t>limpieza </a:t>
+              <a:t>la tabla de Ventas </a:t>
             </a:r>
             <a:r>
               <a:rPr lang="es-PY" sz="1400" dirty="0" smtClean="0">
@@ -15796,7 +15755,7 @@
                   <a:schemeClr val="tx1"/>
                 </a:solidFill>
               </a:rPr>
-              <a:t> y </a:t>
+              <a:t>Detalle, en </a:t>
             </a:r>
             <a:r>
               <a:rPr lang="es-PY" sz="1400" dirty="0">
@@ -15804,7 +15763,63 @@
                   <a:schemeClr val="tx1"/>
                 </a:solidFill>
               </a:rPr>
-              <a:t>transformación de los datos </a:t>
+              <a:t>la tabla de </a:t>
+            </a:r>
+            <a:r>
+              <a:rPr lang="es-PY" sz="1400" b="1" dirty="0">
+                <a:solidFill>
+                  <a:schemeClr val="tx1"/>
+                </a:solidFill>
+              </a:rPr>
+              <a:t>Ventas Detalle </a:t>
+            </a:r>
+            <a:r>
+              <a:rPr lang="es-PY" sz="1400" b="1" dirty="0" smtClean="0">
+                <a:solidFill>
+                  <a:schemeClr val="tx1"/>
+                </a:solidFill>
+              </a:rPr>
+              <a:t>con </a:t>
+            </a:r>
+            <a:r>
+              <a:rPr lang="es-PY" sz="1400" b="1" dirty="0">
+                <a:solidFill>
+                  <a:schemeClr val="tx1"/>
+                </a:solidFill>
+              </a:rPr>
+              <a:t>registros </a:t>
+            </a:r>
+            <a:r>
+              <a:rPr lang="es-PY" sz="1400" b="1" dirty="0" smtClean="0">
+                <a:solidFill>
+                  <a:schemeClr val="tx1"/>
+                </a:solidFill>
+              </a:rPr>
+              <a:t>de valores </a:t>
+            </a:r>
+            <a:r>
+              <a:rPr lang="es-PY" sz="1400" b="1" dirty="0">
+                <a:solidFill>
+                  <a:schemeClr val="tx1"/>
+                </a:solidFill>
+              </a:rPr>
+              <a:t>de costo </a:t>
+            </a:r>
+            <a:r>
+              <a:rPr lang="es-PY" sz="1400" b="1" dirty="0" smtClean="0">
+                <a:solidFill>
+                  <a:schemeClr val="tx1"/>
+                </a:solidFill>
+              </a:rPr>
+              <a:t>cero</a:t>
+            </a:r>
+            <a:r>
+              <a:rPr lang="es-PY" sz="1400" dirty="0">
+                <a:solidFill>
+                  <a:schemeClr val="tx1"/>
+                </a:solidFill>
+              </a:rPr>
+              <a:t>, los cuales eran modificados por el costo promedio del producto </a:t>
             </a:r>
             <a:r>
               <a:rPr lang="es-PY" sz="1400" dirty="0" smtClean="0">
@@ -15812,7 +15827,7 @@
                   <a:schemeClr val="tx1"/>
                 </a:solidFill>
               </a:rPr>
-              <a:t>y el volcado a la fuente destino. </a:t>
+              <a:t>. </a:t>
             </a:r>
             <a:endParaRPr lang="es-ES" sz="1400" dirty="0">
               <a:solidFill>
@@ -15846,7 +15861,7 @@
               <a:t> </a:t>
             </a:r>
             <a:r>
-              <a:rPr lang="es-PY" sz="1800" b="1" dirty="0" err="1" smtClean="0">
+              <a:rPr lang="es-PY" sz="1800" b="1" dirty="0" smtClean="0">
                 <a:solidFill>
                   <a:schemeClr val="tx1"/>
                 </a:solidFill>
@@ -15919,30 +15934,11 @@
               </a:rPr>
               <a:t> </a:t>
             </a:r>
-            <a:r>
-              <a:rPr lang="es-PY" sz="1400" dirty="0">
-                <a:solidFill>
-                  <a:schemeClr val="tx1"/>
-                </a:solidFill>
-              </a:rPr>
-              <a:t>Cabecera, Detalles y </a:t>
-            </a:r>
-            <a:r>
-              <a:rPr lang="es-PY" sz="1400" dirty="0" smtClean="0">
-                <a:solidFill>
-                  <a:schemeClr val="tx1"/>
-                </a:solidFill>
-              </a:rPr>
-              <a:t>Stock</a:t>
-            </a:r>
-            <a:r>
-              <a:rPr lang="es-PY" sz="1400" dirty="0">
-                <a:solidFill>
-                  <a:schemeClr val="tx1"/>
-                </a:solidFill>
-              </a:rPr>
-              <a:t>.</a:t>
-            </a:r>
+            <a:endParaRPr lang="es-PY" dirty="0" smtClean="0">
+              <a:solidFill>
+                <a:schemeClr val="tx1"/>
+              </a:solidFill>
+            </a:endParaRPr>
           </a:p>
           <a:p>
             <a:pPr marL="432000" lvl="1" algn="just">
@@ -15954,7 +15950,7 @@
               </a:spcAft>
             </a:pPr>
             <a:r>
-              <a:rPr lang="es-PY" dirty="0">
+              <a:rPr lang="es-PY" sz="1400" dirty="0">
                 <a:solidFill>
                   <a:schemeClr val="tx1"/>
                 </a:solidFill>
@@ -15962,6 +15958,113 @@
               <a:t>	</a:t>
             </a:r>
             <a:r>
+              <a:rPr lang="es-PY" sz="1400" dirty="0" smtClean="0">
+                <a:solidFill>
+                  <a:schemeClr val="tx1"/>
+                </a:solidFill>
+              </a:rPr>
+              <a:t>	- </a:t>
+            </a:r>
+            <a:r>
+              <a:rPr lang="es-PY" sz="1400" dirty="0" smtClean="0">
+                <a:solidFill>
+                  <a:schemeClr val="tx1"/>
+                </a:solidFill>
+              </a:rPr>
+              <a:t>Cabecera </a:t>
+            </a:r>
+          </a:p>
+          <a:p>
+            <a:pPr marL="432000" lvl="1" algn="just">
+              <a:spcBef>
+                <a:spcPts val="0"/>
+              </a:spcBef>
+              <a:spcAft>
+                <a:spcPts val="0"/>
+              </a:spcAft>
+            </a:pPr>
+            <a:r>
+              <a:rPr lang="es-PY" sz="1400" dirty="0">
+                <a:solidFill>
+                  <a:schemeClr val="tx1"/>
+                </a:solidFill>
+              </a:rPr>
+              <a:t>	</a:t>
+            </a:r>
+            <a:r>
+              <a:rPr lang="es-PY" sz="1400" dirty="0" smtClean="0">
+                <a:solidFill>
+                  <a:schemeClr val="tx1"/>
+                </a:solidFill>
+              </a:rPr>
+              <a:t>	- </a:t>
+            </a:r>
+            <a:r>
+              <a:rPr lang="es-PY" sz="1400" dirty="0" smtClean="0">
+                <a:solidFill>
+                  <a:schemeClr val="tx1"/>
+                </a:solidFill>
+              </a:rPr>
+              <a:t>Detalles</a:t>
+            </a:r>
+          </a:p>
+          <a:p>
+            <a:pPr marL="432000" lvl="1" algn="just">
+              <a:spcBef>
+                <a:spcPts val="0"/>
+              </a:spcBef>
+              <a:spcAft>
+                <a:spcPts val="0"/>
+              </a:spcAft>
+            </a:pPr>
+            <a:r>
+              <a:rPr lang="es-PY" sz="1400" dirty="0">
+                <a:solidFill>
+                  <a:schemeClr val="tx1"/>
+                </a:solidFill>
+              </a:rPr>
+              <a:t>	</a:t>
+            </a:r>
+            <a:r>
+              <a:rPr lang="es-PY" sz="1400" dirty="0" smtClean="0">
+                <a:solidFill>
+                  <a:schemeClr val="tx1"/>
+                </a:solidFill>
+              </a:rPr>
+              <a:t>	- </a:t>
+            </a:r>
+            <a:r>
+              <a:rPr lang="es-PY" sz="1400" dirty="0" smtClean="0">
+                <a:solidFill>
+                  <a:schemeClr val="tx1"/>
+                </a:solidFill>
+              </a:rPr>
+              <a:t>Stock. </a:t>
+            </a:r>
+            <a:endParaRPr lang="es-PY" sz="1400" dirty="0">
+              <a:solidFill>
+                <a:schemeClr val="tx1"/>
+              </a:solidFill>
+            </a:endParaRPr>
+          </a:p>
+          <a:p>
+            <a:pPr marL="432000" lvl="1" algn="just">
+              <a:spcBef>
+                <a:spcPts val="0"/>
+              </a:spcBef>
+              <a:spcAft>
+                <a:spcPts val="0"/>
+              </a:spcAft>
+            </a:pPr>
+            <a:r>
+              <a:rPr lang="es-PY" dirty="0">
+                <a:solidFill>
+                  <a:schemeClr val="tx1"/>
+                </a:solidFill>
+              </a:rPr>
+              <a:t>	</a:t>
+            </a:r>
+            <a:r>
               <a:rPr lang="es-PY" sz="1600" dirty="0" smtClean="0">
                 <a:solidFill>
                   <a:schemeClr val="tx1"/>
@@ -15977,13 +16080,188 @@
               </a:rPr>
               <a:t>Dimensiones: </a:t>
             </a:r>
+            <a:endParaRPr lang="es-PY" sz="1600" dirty="0" smtClean="0">
+              <a:solidFill>
+                <a:schemeClr val="tx1"/>
+              </a:solidFill>
+            </a:endParaRPr>
+          </a:p>
+          <a:p>
+            <a:pPr marL="432000" lvl="1" algn="just">
+              <a:spcBef>
+                <a:spcPts val="0"/>
+              </a:spcBef>
+              <a:spcAft>
+                <a:spcPts val="0"/>
+              </a:spcAft>
+            </a:pPr>
+            <a:r>
+              <a:rPr lang="es-PY" sz="1600" dirty="0">
+                <a:solidFill>
+                  <a:schemeClr val="tx1"/>
+                </a:solidFill>
+              </a:rPr>
+              <a:t>	</a:t>
+            </a:r>
+            <a:r>
+              <a:rPr lang="es-PY" sz="1600" dirty="0" smtClean="0">
+                <a:solidFill>
+                  <a:schemeClr val="tx1"/>
+                </a:solidFill>
+              </a:rPr>
+              <a:t>	- </a:t>
+            </a:r>
+            <a:r>
+              <a:rPr lang="es-PY" sz="1400" dirty="0" smtClean="0">
+                <a:solidFill>
+                  <a:schemeClr val="tx1"/>
+                </a:solidFill>
+              </a:rPr>
+              <a:t>Fecha</a:t>
+            </a:r>
+          </a:p>
+          <a:p>
+            <a:pPr marL="432000" lvl="1" algn="just">
+              <a:spcBef>
+                <a:spcPts val="0"/>
+              </a:spcBef>
+              <a:spcAft>
+                <a:spcPts val="0"/>
+              </a:spcAft>
+            </a:pPr>
             <a:r>
               <a:rPr lang="es-PY" sz="1400" dirty="0">
                 <a:solidFill>
                   <a:schemeClr val="tx1"/>
                 </a:solidFill>
               </a:rPr>
-              <a:t>Fecha, Productos, Proveedores, Clientes, Cajas.</a:t>
+              <a:t>	</a:t>
+            </a:r>
+            <a:r>
+              <a:rPr lang="es-PY" sz="1400" dirty="0" smtClean="0">
+                <a:solidFill>
+                  <a:schemeClr val="tx1"/>
+                </a:solidFill>
+              </a:rPr>
+              <a:t>	- </a:t>
+            </a:r>
+            <a:r>
+              <a:rPr lang="es-PY" sz="1400" dirty="0" smtClean="0">
+                <a:solidFill>
+                  <a:schemeClr val="tx1"/>
+                </a:solidFill>
+              </a:rPr>
+              <a:t>Productos</a:t>
+            </a:r>
+          </a:p>
+          <a:p>
+            <a:pPr marL="432000" lvl="1" algn="just">
+              <a:spcBef>
+                <a:spcPts val="0"/>
+              </a:spcBef>
+              <a:spcAft>
+                <a:spcPts val="0"/>
+              </a:spcAft>
+            </a:pPr>
+            <a:r>
+              <a:rPr lang="es-PY" sz="1400" dirty="0">
+                <a:solidFill>
+                  <a:schemeClr val="tx1"/>
+                </a:solidFill>
+              </a:rPr>
+              <a:t>	</a:t>
+            </a:r>
+            <a:r>
+              <a:rPr lang="es-PY" sz="1400" dirty="0" smtClean="0">
+                <a:solidFill>
+                  <a:schemeClr val="tx1"/>
+                </a:solidFill>
+              </a:rPr>
+              <a:t>	- </a:t>
+            </a:r>
+            <a:r>
+              <a:rPr lang="es-PY" sz="1400" dirty="0" smtClean="0">
+                <a:solidFill>
+                  <a:schemeClr val="tx1"/>
+                </a:solidFill>
+              </a:rPr>
+              <a:t>Proveedores</a:t>
+            </a:r>
+          </a:p>
+          <a:p>
+            <a:pPr marL="432000" lvl="1" algn="just">
+              <a:spcBef>
+                <a:spcPts val="0"/>
+              </a:spcBef>
+              <a:spcAft>
+                <a:spcPts val="0"/>
+              </a:spcAft>
+            </a:pPr>
+            <a:r>
+              <a:rPr lang="es-PY" sz="1400" dirty="0">
+                <a:solidFill>
+                  <a:schemeClr val="tx1"/>
+                </a:solidFill>
+              </a:rPr>
+              <a:t>	</a:t>
+            </a:r>
+            <a:r>
+              <a:rPr lang="es-PY" sz="1400" dirty="0" smtClean="0">
+                <a:solidFill>
+                  <a:schemeClr val="tx1"/>
+                </a:solidFill>
+              </a:rPr>
+              <a:t>	- </a:t>
+            </a:r>
+            <a:r>
+              <a:rPr lang="es-PY" sz="1400" dirty="0" smtClean="0">
+                <a:solidFill>
+                  <a:schemeClr val="tx1"/>
+                </a:solidFill>
+              </a:rPr>
+              <a:t>Clientes</a:t>
+            </a:r>
+          </a:p>
+          <a:p>
+            <a:pPr marL="432000" lvl="1" algn="just">
+              <a:spcBef>
+                <a:spcPts val="0"/>
+              </a:spcBef>
+              <a:spcAft>
+                <a:spcPts val="0"/>
+              </a:spcAft>
+            </a:pPr>
+            <a:r>
+              <a:rPr lang="es-PY" sz="1400" dirty="0">
+                <a:solidFill>
+                  <a:schemeClr val="tx1"/>
+                </a:solidFill>
+              </a:rPr>
+              <a:t>	</a:t>
+            </a:r>
+            <a:r>
+              <a:rPr lang="es-PY" sz="1400" dirty="0" smtClean="0">
+                <a:solidFill>
+                  <a:schemeClr val="tx1"/>
+                </a:solidFill>
+              </a:rPr>
+              <a:t>	- </a:t>
+            </a:r>
+            <a:r>
+              <a:rPr lang="es-PY" sz="1400" dirty="0" smtClean="0">
+                <a:solidFill>
+                  <a:schemeClr val="tx1"/>
+                </a:solidFill>
+              </a:rPr>
+              <a:t>Cajas</a:t>
+            </a:r>
+            <a:r>
+              <a:rPr lang="es-PY" sz="1400" dirty="0">
+                <a:solidFill>
+                  <a:schemeClr val="tx1"/>
+                </a:solidFill>
+              </a:rPr>
+              <a:t>.</a:t>
             </a:r>
             <a:endParaRPr lang="es-ES" sz="1400" dirty="0">
               <a:solidFill>
@@ -16098,15 +16376,7 @@
           <a:p>
             <a:r>
               <a:rPr lang="es-ES" sz="5200" b="1" dirty="0"/>
-              <a:t>Business </a:t>
-            </a:r>
-            <a:r>
-              <a:rPr lang="es-ES" sz="5200" b="1" dirty="0" err="1"/>
-              <a:t>Intelligence</a:t>
-            </a:r>
-            <a:r>
-              <a:rPr lang="es-ES" sz="5200" b="1" dirty="0"/>
-              <a:t> </a:t>
+              <a:t>Business Intelligence </a:t>
             </a:r>
             <a:r>
               <a:rPr lang="es-PY" sz="5200" dirty="0" smtClean="0"/>
@@ -16138,8 +16408,8 @@
         </p:blipFill>
         <p:spPr>
           <a:xfrm>
-            <a:off x="5220072" y="3861048"/>
-            <a:ext cx="3851920" cy="2852936"/>
+            <a:off x="4283968" y="3573016"/>
+            <a:ext cx="4421336" cy="3274676"/>
           </a:xfrm>
           <a:prstGeom prst="rect">
             <a:avLst/>
@@ -16450,7 +16720,7 @@
           <a:p>
             <a:pPr algn="just"/>
             <a:r>
-              <a:rPr lang="en-US" sz="2100" b="1" dirty="0" err="1"/>
+              <a:rPr lang="en-US" sz="2100" b="1" dirty="0"/>
               <a:t>Indicadores</a:t>
             </a:r>
             <a:r>
@@ -16458,7 +16728,7 @@
               <a:t> Claves de </a:t>
             </a:r>
             <a:r>
-              <a:rPr lang="en-US" sz="2100" b="1" dirty="0" err="1" smtClean="0"/>
+              <a:rPr lang="en-US" sz="2100" b="1" dirty="0" smtClean="0"/>
               <a:t>Rendimiento</a:t>
             </a:r>
             <a:endParaRPr lang="en-US" sz="2100" b="1" dirty="0" smtClean="0"/>
@@ -16482,7 +16752,7 @@
               <a:t>KPI (Key Performance </a:t>
             </a:r>
             <a:r>
-              <a:rPr lang="es-PY" sz="1900" dirty="0" err="1">
+              <a:rPr lang="es-PY" sz="1900" dirty="0">
                 <a:solidFill>
                   <a:schemeClr val="tx1"/>
                 </a:solidFill>
@@ -16696,15 +16966,7 @@
           <a:p>
             <a:r>
               <a:rPr lang="es-ES" sz="5200" b="1" dirty="0"/>
-              <a:t>Business </a:t>
-            </a:r>
-            <a:r>
-              <a:rPr lang="es-ES" sz="5200" b="1" dirty="0" err="1"/>
-              <a:t>Intelligence</a:t>
-            </a:r>
-            <a:r>
-              <a:rPr lang="es-ES" sz="5200" b="1" dirty="0"/>
-              <a:t> </a:t>
+              <a:t>Business Intelligence </a:t>
             </a:r>
             <a:r>
               <a:rPr lang="es-PY" sz="5200" dirty="0" smtClean="0"/>
@@ -17162,120 +17424,141 @@
           <a:p>
             <a:pPr algn="just"/>
             <a:r>
-              <a:rPr lang="en-US" sz="2100" b="1" dirty="0" err="1" smtClean="0"/>
+              <a:rPr lang="es-PY" sz="2100" b="1" dirty="0" smtClean="0"/>
               <a:t>Asignación</a:t>
+            </a:r>
+            <a:r>
+              <a:rPr lang="en-US" sz="2100" b="1" dirty="0" smtClean="0"/>
+              <a:t> </a:t>
+            </a:r>
+            <a:r>
+              <a:rPr lang="en-US" sz="2100" b="1" dirty="0" smtClean="0"/>
+              <a:t>de </a:t>
+            </a:r>
+            <a:r>
+              <a:rPr lang="en-US" sz="2100" b="1" dirty="0" smtClean="0"/>
+              <a:t>etiquetas</a:t>
+            </a:r>
+            <a:endParaRPr lang="en-US" sz="2100" b="1" dirty="0" smtClean="0"/>
+          </a:p>
+          <a:p>
+            <a:pPr marL="180000" algn="just"/>
+            <a:r>
+              <a:rPr lang="es-PY" sz="1600" dirty="0"/>
+              <a:t>A cada </a:t>
+            </a:r>
+            <a:r>
+              <a:rPr lang="es-PY" sz="1600" dirty="0" smtClean="0"/>
+              <a:t>fila </a:t>
+            </a:r>
+            <a:r>
+              <a:rPr lang="es-PY" sz="1600" dirty="0"/>
+              <a:t>de valores KPI obtenidos para cada producto se </a:t>
+            </a:r>
+            <a:r>
+              <a:rPr lang="es-PY" sz="1600" dirty="0" smtClean="0"/>
+              <a:t>asigna </a:t>
+            </a:r>
+            <a:r>
+              <a:rPr lang="es-PY" sz="1600" dirty="0"/>
+              <a:t>una etiqueta </a:t>
+            </a:r>
+            <a:r>
+              <a:rPr lang="es-PY" sz="1600" dirty="0" smtClean="0"/>
+              <a:t>que debe ser </a:t>
+            </a:r>
+            <a:r>
+              <a:rPr lang="es-PY" sz="1600" dirty="0"/>
+              <a:t>realizada y revisada por el experto del área de </a:t>
+            </a:r>
+            <a:r>
+              <a:rPr lang="es-PY" sz="1600" dirty="0" smtClean="0"/>
+              <a:t>compras de la </a:t>
+            </a:r>
+            <a:r>
+              <a:rPr lang="es-PY" sz="1600" dirty="0" smtClean="0"/>
+              <a:t>empresa. </a:t>
+            </a:r>
+            <a:r>
+              <a:rPr lang="es-PY" sz="1600" dirty="0" smtClean="0"/>
+              <a:t>Para </a:t>
+            </a:r>
+            <a:r>
+              <a:rPr lang="es-PY" sz="1600" dirty="0"/>
+              <a:t>el presente trabajo el etiquetado fue realizado en forma empírica, sin la intervención de un experto por la dificultad de contar con una persona especializada en el </a:t>
+            </a:r>
+            <a:r>
+              <a:rPr lang="es-PY" sz="1600" dirty="0" smtClean="0"/>
+              <a:t>área.</a:t>
+            </a:r>
+            <a:endParaRPr lang="es-PY" sz="1600" dirty="0" smtClean="0"/>
+          </a:p>
+          <a:p>
+            <a:pPr algn="just"/>
+            <a:r>
+              <a:rPr lang="es-PY" sz="2100" b="1" dirty="0" smtClean="0"/>
+              <a:t>Periodo</a:t>
+            </a:r>
+            <a:r>
+              <a:rPr lang="es-PY" sz="1600" dirty="0" smtClean="0"/>
+              <a:t> : Semanal, quincenal o Mensual.</a:t>
+            </a:r>
+          </a:p>
+          <a:p>
+            <a:pPr algn="just"/>
+            <a:r>
+              <a:rPr lang="en-US" sz="2100" b="1" dirty="0" smtClean="0"/>
+              <a:t>Etiquetas</a:t>
+            </a:r>
+            <a:r>
+              <a:rPr lang="en-US" sz="2100" b="1" dirty="0" smtClean="0"/>
+              <a:t>:  [</a:t>
+            </a:r>
+            <a:r>
+              <a:rPr lang="en-US" dirty="0" smtClean="0"/>
+              <a:t>Nada, </a:t>
+            </a:r>
+            <a:r>
+              <a:rPr lang="en-US" dirty="0" smtClean="0"/>
+              <a:t>Poco</a:t>
+            </a:r>
+            <a:r>
+              <a:rPr lang="en-US" dirty="0" smtClean="0"/>
+              <a:t>, Medio, Mucho</a:t>
+            </a:r>
+            <a:r>
+              <a:rPr lang="en-US" dirty="0"/>
+              <a:t>]</a:t>
+            </a:r>
+          </a:p>
+          <a:p>
+            <a:pPr algn="just"/>
+            <a:endParaRPr lang="en-US" sz="2100" b="1" dirty="0" smtClean="0"/>
+          </a:p>
+          <a:p>
+            <a:pPr algn="just"/>
+            <a:endParaRPr lang="en-US" sz="2100" b="1" dirty="0"/>
+          </a:p>
+          <a:p>
+            <a:pPr algn="just"/>
+            <a:r>
+              <a:rPr lang="en-US" sz="2100" b="1" dirty="0" smtClean="0"/>
+              <a:t>Resultado</a:t>
+            </a:r>
+            <a:r>
+              <a:rPr lang="en-US" sz="2100" b="1" dirty="0" smtClean="0"/>
+              <a:t> de la </a:t>
+            </a:r>
+            <a:r>
+              <a:rPr lang="en-US" sz="2100" b="1" dirty="0" smtClean="0"/>
+              <a:t>asignación</a:t>
             </a:r>
             <a:r>
               <a:rPr lang="en-US" sz="2100" b="1" dirty="0" smtClean="0"/>
               <a:t> de </a:t>
             </a:r>
             <a:r>
-              <a:rPr lang="en-US" sz="2100" b="1" dirty="0" err="1" smtClean="0"/>
-              <a:t>etiquetas</a:t>
-            </a:r>
-            <a:endParaRPr lang="en-US" sz="2100" b="1" dirty="0" smtClean="0"/>
-          </a:p>
-          <a:p>
-            <a:pPr marL="180000" algn="just"/>
-            <a:r>
-              <a:rPr lang="es-PY" sz="1600" dirty="0"/>
-              <a:t>A cada </a:t>
-            </a:r>
-            <a:r>
-              <a:rPr lang="es-PY" sz="1600" dirty="0" smtClean="0"/>
-              <a:t>fila </a:t>
-            </a:r>
-            <a:r>
-              <a:rPr lang="es-PY" sz="1600" dirty="0"/>
-              <a:t>de valores KPI obtenidos para cada producto se </a:t>
-            </a:r>
-            <a:r>
-              <a:rPr lang="es-PY" sz="1600" dirty="0" smtClean="0"/>
-              <a:t>asigna </a:t>
-            </a:r>
-            <a:r>
-              <a:rPr lang="es-PY" sz="1600" dirty="0"/>
-              <a:t>una etiqueta </a:t>
-            </a:r>
-            <a:r>
-              <a:rPr lang="es-PY" sz="1600" dirty="0" smtClean="0"/>
-              <a:t>que debe ser </a:t>
-            </a:r>
-            <a:r>
-              <a:rPr lang="es-PY" sz="1600" dirty="0"/>
-              <a:t>realizada y revisada por el experto del área de </a:t>
-            </a:r>
-            <a:r>
-              <a:rPr lang="es-PY" sz="1600" dirty="0" smtClean="0"/>
-              <a:t>compras de la empresa.</a:t>
-            </a:r>
-          </a:p>
-          <a:p>
-            <a:pPr algn="just"/>
-            <a:r>
-              <a:rPr lang="es-PY" sz="2100" b="1" dirty="0" smtClean="0"/>
-              <a:t>Periodo</a:t>
-            </a:r>
-            <a:r>
-              <a:rPr lang="es-PY" sz="1600" dirty="0" smtClean="0"/>
-              <a:t> : Semanal, quincenal o Mensual.</a:t>
-            </a:r>
-          </a:p>
-          <a:p>
-            <a:pPr algn="just"/>
-            <a:r>
-              <a:rPr lang="en-US" sz="2100" b="1" dirty="0" err="1" smtClean="0"/>
-              <a:t>Etiquetas</a:t>
-            </a:r>
-            <a:r>
               <a:rPr lang="en-US" sz="2100" b="1" dirty="0" smtClean="0"/>
-              <a:t>:  [</a:t>
-            </a:r>
-            <a:r>
-              <a:rPr lang="en-US" dirty="0" smtClean="0"/>
-              <a:t>Nada, </a:t>
-            </a:r>
-            <a:r>
-              <a:rPr lang="en-US" dirty="0" err="1" smtClean="0"/>
-              <a:t>Poco</a:t>
-            </a:r>
-            <a:r>
-              <a:rPr lang="en-US" dirty="0" smtClean="0"/>
-              <a:t>, Medio, Mucho</a:t>
-            </a:r>
-            <a:r>
-              <a:rPr lang="en-US" dirty="0"/>
-              <a:t>]</a:t>
-            </a:r>
-          </a:p>
-          <a:p>
-            <a:pPr algn="just"/>
-            <a:endParaRPr lang="en-US" sz="2100" b="1" dirty="0" smtClean="0"/>
-          </a:p>
-          <a:p>
-            <a:pPr algn="just"/>
-            <a:endParaRPr lang="en-US" sz="2100" b="1" dirty="0"/>
-          </a:p>
-          <a:p>
-            <a:pPr algn="just"/>
-            <a:r>
-              <a:rPr lang="en-US" sz="2100" b="1" dirty="0" err="1" smtClean="0"/>
-              <a:t>Resultado</a:t>
-            </a:r>
-            <a:r>
-              <a:rPr lang="en-US" sz="2100" b="1" dirty="0" smtClean="0"/>
-              <a:t> de la </a:t>
-            </a:r>
-            <a:r>
-              <a:rPr lang="en-US" sz="2100" b="1" dirty="0" err="1" smtClean="0"/>
-              <a:t>asignación</a:t>
-            </a:r>
-            <a:r>
-              <a:rPr lang="en-US" sz="2100" b="1" dirty="0" smtClean="0"/>
-              <a:t> de </a:t>
-            </a:r>
-            <a:r>
-              <a:rPr lang="en-US" sz="2100" b="1" dirty="0" err="1" smtClean="0"/>
               <a:t>etiquetas</a:t>
             </a:r>
             <a:endParaRPr lang="en-US" sz="2100" b="1" dirty="0" smtClean="0"/>
@@ -17387,15 +17670,7 @@
           <a:p>
             <a:r>
               <a:rPr lang="es-ES" sz="5200" b="1" dirty="0"/>
-              <a:t>Business </a:t>
-            </a:r>
-            <a:r>
-              <a:rPr lang="es-ES" sz="5200" b="1" dirty="0" err="1"/>
-              <a:t>Intelligence</a:t>
-            </a:r>
-            <a:r>
-              <a:rPr lang="es-ES" sz="5200" b="1" dirty="0"/>
-              <a:t> </a:t>
+              <a:t>Business Intelligence </a:t>
             </a:r>
             <a:r>
               <a:rPr lang="es-PY" sz="5200" dirty="0" smtClean="0"/>
@@ -17427,7 +17702,7 @@
         </p:blipFill>
         <p:spPr>
           <a:xfrm>
-            <a:off x="1331640" y="4581127"/>
+            <a:off x="1331640" y="4941168"/>
             <a:ext cx="7028591" cy="1527045"/>
           </a:xfrm>
           <a:prstGeom prst="rect">
@@ -17451,7 +17726,7 @@
         </p:blipFill>
         <p:spPr>
           <a:xfrm>
-            <a:off x="1331640" y="3068960"/>
+            <a:off x="1331640" y="3536116"/>
             <a:ext cx="2232248" cy="924888"/>
           </a:xfrm>
           <a:prstGeom prst="rect">
@@ -17475,7 +17750,7 @@
         </p:blipFill>
         <p:spPr>
           <a:xfrm>
-            <a:off x="3635895" y="3068960"/>
+            <a:off x="3635895" y="3536116"/>
             <a:ext cx="2513595" cy="925200"/>
           </a:xfrm>
           <a:prstGeom prst="rect">
@@ -17499,7 +17774,7 @@
         </p:blipFill>
         <p:spPr>
           <a:xfrm>
-            <a:off x="6957841" y="3116764"/>
+            <a:off x="6957841" y="3583920"/>
             <a:ext cx="1859714" cy="925200"/>
           </a:xfrm>
           <a:prstGeom prst="rect">
@@ -17515,7 +17790,7 @@
         </p:nvSpPr>
         <p:spPr>
           <a:xfrm>
-            <a:off x="6300192" y="3531404"/>
+            <a:off x="6300192" y="3998560"/>
             <a:ext cx="504056" cy="246420"/>
           </a:xfrm>
           <a:prstGeom prst="rightArrow">
@@ -17543,7 +17818,7 @@
           <a:lstStyle/>
           <a:p>
             <a:pPr algn="ctr"/>
-            <a:endParaRPr lang="es-PY"/>
+            <a:endParaRPr lang="es-PY" dirty="0"/>
           </a:p>
         </p:txBody>
       </p:sp>
@@ -17688,7 +17963,7 @@
               <a:t>Machine </a:t>
             </a:r>
             <a:r>
-              <a:rPr lang="es-ES" b="1" dirty="0" err="1" smtClean="0"/>
+              <a:rPr lang="es-ES" b="1" dirty="0" smtClean="0"/>
               <a:t>Learning</a:t>
             </a:r>
             <a:r>
@@ -17978,7 +18253,7 @@
               <a:t>“Machine </a:t>
             </a:r>
             <a:r>
-              <a:rPr lang="es-ES" sz="2100" i="1" dirty="0" err="1">
+              <a:rPr lang="es-ES" sz="2100" i="1" dirty="0">
                 <a:solidFill>
                   <a:schemeClr val="tx1"/>
                 </a:solidFill>
@@ -18023,7 +18298,7 @@
               <a:buAutoNum type="arabicPeriod"/>
             </a:pPr>
             <a:r>
-              <a:rPr lang="en-US" sz="2100" b="1" dirty="0" err="1" smtClean="0"/>
+              <a:rPr lang="en-US" sz="2100" b="1" dirty="0" smtClean="0"/>
               <a:t>Categoría</a:t>
             </a:r>
             <a:r>
@@ -18035,7 +18310,7 @@
               <a:t>de </a:t>
             </a:r>
             <a:r>
-              <a:rPr lang="en-US" sz="2100" b="1" dirty="0" err="1"/>
+              <a:rPr lang="en-US" sz="2100" b="1" dirty="0"/>
               <a:t>los</a:t>
             </a:r>
             <a:r>
@@ -18043,7 +18318,7 @@
               <a:t> </a:t>
             </a:r>
             <a:r>
-              <a:rPr lang="en-US" sz="2100" b="1" dirty="0" err="1"/>
+              <a:rPr lang="en-US" sz="2100" b="1" dirty="0"/>
               <a:t>algoritmos</a:t>
             </a:r>
             <a:endParaRPr lang="en-US" sz="2100" b="1" dirty="0"/>
@@ -18101,7 +18376,7 @@
               <a:buAutoNum type="arabicPeriod"/>
             </a:pPr>
             <a:r>
-              <a:rPr lang="en-US" sz="2100" b="1" dirty="0" err="1"/>
+              <a:rPr lang="en-US" sz="2100" b="1" dirty="0"/>
               <a:t>Tipos</a:t>
             </a:r>
             <a:r>
@@ -18109,7 +18384,7 @@
               <a:t> de </a:t>
             </a:r>
             <a:r>
-              <a:rPr lang="en-US" sz="2100" b="1" dirty="0" err="1" smtClean="0"/>
+              <a:rPr lang="en-US" sz="2100" b="1" dirty="0" smtClean="0"/>
               <a:t>problemas</a:t>
             </a:r>
             <a:endParaRPr lang="en-US" sz="2100" b="1" dirty="0"/>
@@ -18231,7 +18506,7 @@
               <a:t>Clasificación </a:t>
             </a:r>
             <a:r>
-              <a:rPr lang="es-ES" sz="2100" dirty="0" err="1" smtClean="0">
+              <a:rPr lang="es-ES" sz="2100" dirty="0" smtClean="0">
                 <a:solidFill>
                   <a:schemeClr val="tx1"/>
                 </a:solidFill>

</xml_diff>